<commit_message>
Pratice code + Lecture code is added
</commit_message>
<xml_diff>
--- a/Lecture Notes-Slides/Lecture 4.pptx
+++ b/Lecture Notes-Slides/Lecture 4.pptx
@@ -325,7 +325,7 @@
             <a:fld id="{04AF466F-BDA4-4F18-9C7B-FF0A9A1B0E80}" type="datetime1">
               <a:rPr lang="en-US" smtClean="0"/>
               <a:pPr/>
-              <a:t>2/7/16</a:t>
+              <a:t>2/8/16</a:t>
             </a:fld>
             <a:endParaRPr lang="en-US"/>
           </a:p>
@@ -492,7 +492,7 @@
             <a:fld id="{58FB4290-6522-4139-852E-05BD9E7F0D2E}" type="datetime1">
               <a:rPr lang="en-US" smtClean="0"/>
               <a:pPr/>
-              <a:t>2/7/16</a:t>
+              <a:t>2/8/16</a:t>
             </a:fld>
             <a:endParaRPr lang="en-US"/>
           </a:p>
@@ -669,7 +669,7 @@
             <a:fld id="{AAB955F9-81EA-47C5-8059-9E5C2B437C70}" type="datetime1">
               <a:rPr lang="en-US" smtClean="0"/>
               <a:pPr/>
-              <a:t>2/7/16</a:t>
+              <a:t>2/8/16</a:t>
             </a:fld>
             <a:endParaRPr lang="en-US"/>
           </a:p>
@@ -836,7 +836,7 @@
             <a:fld id="{1CEF607B-A47E-422C-9BEF-122CCDB7C526}" type="datetime1">
               <a:rPr lang="en-US" smtClean="0"/>
               <a:pPr/>
-              <a:t>2/7/16</a:t>
+              <a:t>2/8/16</a:t>
             </a:fld>
             <a:endParaRPr lang="en-US"/>
           </a:p>
@@ -1079,7 +1079,7 @@
             <a:fld id="{63A9A7CB-BEE6-4F99-898E-913F06E8E125}" type="datetime1">
               <a:rPr lang="en-US" smtClean="0"/>
               <a:pPr/>
-              <a:t>2/7/16</a:t>
+              <a:t>2/8/16</a:t>
             </a:fld>
             <a:endParaRPr lang="en-US"/>
           </a:p>
@@ -1364,7 +1364,7 @@
             <a:fld id="{B6EE300C-6FC5-4FC3-AF1A-075E4F50620D}" type="datetime1">
               <a:rPr lang="en-US" smtClean="0"/>
               <a:pPr/>
-              <a:t>2/7/16</a:t>
+              <a:t>2/8/16</a:t>
             </a:fld>
             <a:endParaRPr lang="en-US"/>
           </a:p>
@@ -1795,7 +1795,7 @@
             <a:fld id="{F50D295D-4A77-4DEB-B04C-9F4282A8BC04}" type="datetime1">
               <a:rPr lang="en-US" smtClean="0"/>
               <a:pPr/>
-              <a:t>2/7/16</a:t>
+              <a:t>2/8/16</a:t>
             </a:fld>
             <a:endParaRPr lang="en-US"/>
           </a:p>
@@ -1910,7 +1910,7 @@
             <a:fld id="{02B28685-4D0C-42D5-8013-B5904CD1FCBC}" type="datetime1">
               <a:rPr lang="en-US" smtClean="0"/>
               <a:pPr/>
-              <a:t>2/7/16</a:t>
+              <a:t>2/8/16</a:t>
             </a:fld>
             <a:endParaRPr lang="en-US"/>
           </a:p>
@@ -2002,7 +2002,7 @@
             <a:fld id="{FDF226C0-9885-4BA9-BBFA-A52CBFEBB775}" type="datetime1">
               <a:rPr lang="en-US" smtClean="0"/>
               <a:pPr/>
-              <a:t>2/7/16</a:t>
+              <a:t>2/8/16</a:t>
             </a:fld>
             <a:endParaRPr lang="en-US"/>
           </a:p>
@@ -2193,7 +2193,7 @@
             <a:fld id="{EBEE1B38-C5EB-4D66-9137-0AFE9CDEDE8F}" type="datetime1">
               <a:rPr lang="en-US" smtClean="0"/>
               <a:pPr/>
-              <a:t>2/7/16</a:t>
+              <a:t>2/8/16</a:t>
             </a:fld>
             <a:endParaRPr lang="en-US"/>
           </a:p>
@@ -2513,7 +2513,7 @@
             <a:fld id="{327B613C-1AD7-49D3-885D-F654C5CDBAA6}" type="datetime1">
               <a:rPr lang="en-US" smtClean="0"/>
               <a:pPr/>
-              <a:t>2/7/16</a:t>
+              <a:t>2/8/16</a:t>
             </a:fld>
             <a:endParaRPr lang="en-US" dirty="0"/>
           </a:p>
@@ -2895,7 +2895,7 @@
             <a:fld id="{327B613C-1AD7-49D3-885D-F654C5CDBAA6}" type="datetime1">
               <a:rPr lang="en-US" smtClean="0"/>
               <a:pPr/>
-              <a:t>2/7/16</a:t>
+              <a:t>2/8/16</a:t>
             </a:fld>
             <a:endParaRPr lang="en-US" dirty="0"/>
           </a:p>
@@ -8483,6 +8483,47 @@
               <a:rPr lang="en-US" dirty="0" smtClean="0"/>
               <a:t>on your terminal window/command line </a:t>
             </a:r>
+            <a:endParaRPr lang="en-US" dirty="0" smtClean="0"/>
+          </a:p>
+          <a:p>
+            <a:r>
+              <a:rPr lang="en-US" dirty="0" smtClean="0"/>
+              <a:t>Also, please check if you have </a:t>
+            </a:r>
+            <a:r>
+              <a:rPr lang="en-US" dirty="0" err="1" smtClean="0"/>
+              <a:t>seaborn</a:t>
+            </a:r>
+            <a:r>
+              <a:rPr lang="en-US" dirty="0" smtClean="0"/>
+              <a:t> package.</a:t>
+            </a:r>
+          </a:p>
+          <a:p>
+            <a:r>
+              <a:rPr lang="en-US" dirty="0" smtClean="0"/>
+              <a:t>If not type “</a:t>
+            </a:r>
+            <a:r>
+              <a:rPr lang="en-US" dirty="0" err="1" smtClean="0"/>
+              <a:t>conda</a:t>
+            </a:r>
+            <a:r>
+              <a:rPr lang="en-US" dirty="0" smtClean="0"/>
+              <a:t> install </a:t>
+            </a:r>
+            <a:r>
+              <a:rPr lang="en-US" dirty="0" err="1" smtClean="0"/>
+              <a:t>seaborn</a:t>
+            </a:r>
+            <a:r>
+              <a:rPr lang="en-US" dirty="0" smtClean="0"/>
+              <a:t>” on your terminal window/</a:t>
+            </a:r>
+            <a:r>
+              <a:rPr lang="en-US" smtClean="0"/>
+              <a:t>command line</a:t>
+            </a:r>
             <a:endParaRPr lang="en-US" dirty="0"/>
           </a:p>
         </p:txBody>
@@ -8733,7 +8774,7 @@
           <a:graphicData uri="http://schemas.openxmlformats.org/presentationml/2006/ole">
             <mc:AlternateContent xmlns:mc="http://schemas.openxmlformats.org/markup-compatibility/2006">
               <mc:Choice xmlns:v="urn:schemas-microsoft-com:vml" Requires="v">
-                <p:oleObj spid="_x0000_s1031" name="Equation" r:id="rId3" imgW="114300" imgH="165100" progId="Equation.3">
+                <p:oleObj spid="_x0000_s1033" name="Equation" r:id="rId3" imgW="114300" imgH="165100" progId="Equation.3">
                   <p:embed/>
                 </p:oleObj>
               </mc:Choice>

</xml_diff>